<commit_message>
update section headers for preface and first section
</commit_message>
<xml_diff>
--- a/images/cover_art.pptx
+++ b/images/cover_art.pptx
@@ -104,6 +104,11 @@
       </a:defRPr>
     </a:lvl9pPr>
   </p:defaultTextStyle>
+  <p:extLst>
+    <p:ext uri="{EFAFB233-063F-42B5-8137-9DF3F51BA10A}">
+      <p15:sldGuideLst xmlns:p15="http://schemas.microsoft.com/office/powerpoint/2012/main"/>
+    </p:ext>
+  </p:extLst>
 </p:presentation>
 </file>
 
@@ -3335,10 +3340,10 @@
         </p:nvGrpSpPr>
         <p:grpSpPr>
           <a:xfrm>
-            <a:off x="3143249" y="409575"/>
-            <a:ext cx="5905502" cy="5972175"/>
-            <a:chOff x="3143249" y="409575"/>
-            <a:chExt cx="5905502" cy="5972175"/>
+            <a:off x="3143249" y="457200"/>
+            <a:ext cx="5905502" cy="5924550"/>
+            <a:chOff x="3143249" y="457200"/>
+            <a:chExt cx="5905502" cy="5924550"/>
           </a:xfrm>
         </p:grpSpPr>
         <p:pic>
@@ -3390,8 +3395,8 @@
           </p:nvSpPr>
           <p:spPr>
             <a:xfrm>
-              <a:off x="3143249" y="409575"/>
-              <a:ext cx="5905502" cy="954107"/>
+              <a:off x="3143249" y="479247"/>
+              <a:ext cx="5905502" cy="861774"/>
             </a:xfrm>
             <a:prstGeom prst="rect">
               <a:avLst/>
@@ -3406,7 +3411,7 @@
             <a:p>
               <a:pPr algn="ctr"/>
               <a:r>
-                <a:rPr lang="en-US" sz="2800" dirty="0">
+                <a:rPr lang="en-US" sz="2500" dirty="0">
                   <a:solidFill>
                     <a:schemeClr val="bg1"/>
                   </a:solidFill>
@@ -3416,7 +3421,7 @@
                 <a:t>Data Science for</a:t>
               </a:r>
               <a:br>
-                <a:rPr lang="en-US" sz="2800" dirty="0">
+                <a:rPr lang="en-US" sz="2500" dirty="0">
                   <a:solidFill>
                     <a:schemeClr val="bg1"/>
                   </a:solidFill>
@@ -3425,7 +3430,7 @@
                 </a:rPr>
               </a:br>
               <a:r>
-                <a:rPr lang="en-US" sz="2800" dirty="0">
+                <a:rPr lang="en-US" sz="2500" dirty="0">
                   <a:solidFill>
                     <a:schemeClr val="bg1"/>
                   </a:solidFill>

</xml_diff>